<commit_message>
Ben's changes - I hope this file works now
</commit_message>
<xml_diff>
--- a/NeSI_I_Have_a Problem_and_I_Need_Support/NeSI_Service_Desk.pptx
+++ b/NeSI_I_Have_a Problem_and_I_Need_Support/NeSI_Service_Desk.pptx
@@ -202,7 +202,7 @@
           <a:p>
             <a:fld id="{271B8E02-D6ED-C74A-B267-DCBD1F5BCC55}" type="datetime1">
               <a:rPr lang="en-NZ" smtClean="0"/>
-              <a:t>12/03/15</a:t>
+              <a:t>17/03/15</a:t>
             </a:fld>
             <a:endParaRPr lang="en-NZ"/>
           </a:p>
@@ -372,7 +372,7 @@
           <a:p>
             <a:fld id="{D4F863EB-014E-EA45-958A-2E7D6F94880C}" type="datetime1">
               <a:rPr lang="en-NZ" smtClean="0"/>
-              <a:t>12/03/15</a:t>
+              <a:t>17/03/15</a:t>
             </a:fld>
             <a:endParaRPr lang="en-NZ"/>
           </a:p>
@@ -12950,7 +12950,15 @@
             </a:pPr>
             <a:r>
               <a:rPr lang="en-US" sz="6400" dirty="0" smtClean="0"/>
-              <a:t>NeSI’s Service Desk is maintained by all NeSI staff members around the country</a:t>
+              <a:t>NeSI’s Service Desk is </a:t>
+            </a:r>
+            <a:r>
+              <a:rPr lang="en-US" sz="6400" dirty="0" smtClean="0"/>
+              <a:t>staffed by </a:t>
+            </a:r>
+            <a:r>
+              <a:rPr lang="en-US" sz="6400" dirty="0" smtClean="0"/>
+              <a:t>all NeSI staff members around the country</a:t>
             </a:r>
           </a:p>
           <a:p>
@@ -12963,7 +12971,15 @@
             </a:pPr>
             <a:r>
               <a:rPr lang="en-US" sz="6400" dirty="0" smtClean="0"/>
-              <a:t>One staff member is accountable for the triage of newly created tickets</a:t>
+              <a:t>One staff member is </a:t>
+            </a:r>
+            <a:r>
+              <a:rPr lang="en-US" sz="6400" dirty="0" smtClean="0"/>
+              <a:t>responsible for triaging newly </a:t>
+            </a:r>
+            <a:r>
+              <a:rPr lang="en-US" sz="6400" dirty="0" smtClean="0"/>
+              <a:t>created tickets</a:t>
             </a:r>
           </a:p>
           <a:p>
@@ -13015,7 +13031,19 @@
             </a:pPr>
             <a:r>
               <a:rPr lang="en-US" sz="6400" dirty="0" smtClean="0"/>
-              <a:t>The Service Desk is designed to make sure user requests reach the domain expert quickly</a:t>
+              <a:t>Our service desk procedures are designed </a:t>
+            </a:r>
+            <a:r>
+              <a:rPr lang="en-US" sz="6400" dirty="0" smtClean="0"/>
+              <a:t>to make sure user requests reach </a:t>
+            </a:r>
+            <a:r>
+              <a:rPr lang="en-US" sz="6400" dirty="0" smtClean="0"/>
+              <a:t>a domain </a:t>
+            </a:r>
+            <a:r>
+              <a:rPr lang="en-US" sz="6400" dirty="0" smtClean="0"/>
+              <a:t>expert quickly</a:t>
             </a:r>
           </a:p>
           <a:p>
@@ -14484,7 +14512,7 @@
           <p:nvPr>
             <p:extLst>
               <p:ext uri="{D42A27DB-BD31-4B8C-83A1-F6EECF244321}">
-                <p14:modId xmlns:p14="http://schemas.microsoft.com/office/powerpoint/2010/main" val="2938411193"/>
+                <p14:modId xmlns:p14="http://schemas.microsoft.com/office/powerpoint/2010/main" val="818434483"/>
               </p:ext>
             </p:extLst>
           </p:nvPr>
@@ -14513,9 +14541,35 @@
                     <a:p>
                       <a:r>
                         <a:rPr lang="en-US" b="1" i="1" dirty="0" smtClean="0"/>
-                        <a:t>Urgency\Impact</a:t>
+                        <a:t>Urgency</a:t>
                       </a:r>
-                      <a:endParaRPr lang="en-US" b="1" i="1" dirty="0"/>
+                      <a:r>
+                        <a:rPr lang="en-US" b="1" i="1" baseline="0" dirty="0" smtClean="0"/>
+                        <a:t> </a:t>
+                      </a:r>
+                      <a:r>
+                        <a:rPr lang="en-US" b="1" i="0" baseline="0" dirty="0" smtClean="0">
+                          <a:latin typeface="Wingdings"/>
+                          <a:ea typeface="Wingdings"/>
+                          <a:cs typeface="Wingdings"/>
+                          <a:sym typeface="Wingdings"/>
+                        </a:rPr>
+                        <a:t></a:t>
+                      </a:r>
+                      <a:r>
+                        <a:rPr lang="en-US" b="1" i="1" dirty="0" smtClean="0"/>
+                        <a:t> Impact </a:t>
+                      </a:r>
+                      <a:r>
+                        <a:rPr lang="en-US" b="1" i="0" dirty="0" smtClean="0">
+                          <a:latin typeface="Wingdings"/>
+                          <a:ea typeface="Wingdings"/>
+                          <a:cs typeface="Wingdings"/>
+                          <a:sym typeface="Wingdings"/>
+                        </a:rPr>
+                        <a:t></a:t>
+                      </a:r>
+                      <a:endParaRPr lang="en-US" b="1" i="0" dirty="0"/>
                     </a:p>
                   </a:txBody>
                   <a:tcPr/>
@@ -14571,7 +14625,11 @@
                     <a:p>
                       <a:r>
                         <a:rPr lang="en-US" b="1" i="1" dirty="0" smtClean="0"/>
-                        <a:t>Low(single User)</a:t>
+                        <a:t>Low (</a:t>
+                      </a:r>
+                      <a:r>
+                        <a:rPr lang="en-US" b="1" i="1" dirty="0" smtClean="0"/>
+                        <a:t>single User)</a:t>
                       </a:r>
                       <a:endParaRPr lang="en-US" b="1" i="1" dirty="0"/>
                     </a:p>
@@ -14817,7 +14875,22 @@
             </a:pPr>
             <a:r>
               <a:rPr lang="en-US" sz="4400" dirty="0" smtClean="0"/>
-              <a:t>Ticket requesters are usually contacted by a domain expert to gather more detail.</a:t>
+              <a:t>Ticket requesters are usually contacted by a domain expert to </a:t>
+            </a:r>
+            <a:r>
+              <a:rPr lang="en-US" sz="4400" dirty="0" smtClean="0"/>
+              <a:t>gather</a:t>
+            </a:r>
+            <a:br>
+              <a:rPr lang="en-US" sz="4400" dirty="0" smtClean="0"/>
+            </a:br>
+            <a:r>
+              <a:rPr lang="en-US" sz="4400" dirty="0" smtClean="0"/>
+              <a:t>more </a:t>
+            </a:r>
+            <a:r>
+              <a:rPr lang="en-US" sz="4400" dirty="0" smtClean="0"/>
+              <a:t>detail.</a:t>
             </a:r>
           </a:p>
           <a:p>
@@ -14830,7 +14903,22 @@
             </a:pPr>
             <a:r>
               <a:rPr lang="en-US" sz="4400" dirty="0" smtClean="0"/>
-              <a:t>Domain experts may seek additional support from other colleagues or assign a ticket to someone who has more knowledge of the ticket’s domain.</a:t>
+              <a:t>Domain experts may seek additional support from other </a:t>
+            </a:r>
+            <a:r>
+              <a:rPr lang="en-US" sz="4400" dirty="0" smtClean="0"/>
+              <a:t>colleagues</a:t>
+            </a:r>
+            <a:br>
+              <a:rPr lang="en-US" sz="4400" dirty="0" smtClean="0"/>
+            </a:br>
+            <a:r>
+              <a:rPr lang="en-US" sz="4400" dirty="0" smtClean="0"/>
+              <a:t>or </a:t>
+            </a:r>
+            <a:r>
+              <a:rPr lang="en-US" sz="4400" dirty="0" smtClean="0"/>
+              <a:t>assign a ticket to someone who has more knowledge of the ticket’s domain.</a:t>
             </a:r>
           </a:p>
           <a:p>
@@ -14843,7 +14931,34 @@
             </a:pPr>
             <a:r>
               <a:rPr lang="en-US" sz="4400" dirty="0" smtClean="0"/>
-              <a:t>Ticket requesters are typically asked the effectiveness of proposed resolution before the tickets are set as solved.</a:t>
+              <a:t>For non-routine requests, ticket requesters </a:t>
+            </a:r>
+            <a:r>
+              <a:rPr lang="en-US" sz="4400" dirty="0" smtClean="0"/>
+              <a:t>are typically </a:t>
+            </a:r>
+            <a:r>
+              <a:rPr lang="en-US" sz="4400" dirty="0" smtClean="0"/>
+              <a:t>asked about the</a:t>
+            </a:r>
+            <a:br>
+              <a:rPr lang="en-US" sz="4400" dirty="0" smtClean="0"/>
+            </a:br>
+            <a:r>
+              <a:rPr lang="en-US" sz="4400" dirty="0" smtClean="0"/>
+              <a:t>effectiveness of the </a:t>
+            </a:r>
+            <a:r>
+              <a:rPr lang="en-US" sz="4400" dirty="0" smtClean="0"/>
+              <a:t>proposed resolution before the </a:t>
+            </a:r>
+            <a:r>
+              <a:rPr lang="en-US" sz="4400" dirty="0" smtClean="0"/>
+              <a:t>ticket is marked as solved</a:t>
+            </a:r>
+            <a:r>
+              <a:rPr lang="en-US" sz="4400" dirty="0" smtClean="0"/>
+              <a:t>.</a:t>
             </a:r>
           </a:p>
           <a:p>
@@ -14856,8 +14971,13 @@
             </a:pPr>
             <a:r>
               <a:rPr lang="en-US" sz="4400" dirty="0" smtClean="0"/>
-              <a:t>The Service Desk aims to connect a user who needs support and a domain expert directly.</a:t>
-            </a:r>
+              <a:t>The Service Desk aims to connect </a:t>
+            </a:r>
+            <a:r>
+              <a:rPr lang="en-US" sz="4400" dirty="0" smtClean="0"/>
+              <a:t>the user directly to a domain expert.</a:t>
+            </a:r>
+            <a:endParaRPr lang="en-US" sz="4400" dirty="0" smtClean="0"/>
           </a:p>
           <a:p>
             <a:pPr marL="342900" indent="-342900">
@@ -14940,7 +15060,19 @@
             <a:pPr algn="ctr"/>
             <a:r>
               <a:rPr lang="en-US" dirty="0" smtClean="0"/>
-              <a:t>No multi-tired support model and middle man</a:t>
+              <a:t>No multi-</a:t>
+            </a:r>
+            <a:r>
+              <a:rPr lang="en-US" dirty="0" smtClean="0"/>
+              <a:t>tiered </a:t>
+            </a:r>
+            <a:r>
+              <a:rPr lang="en-US" dirty="0" smtClean="0"/>
+              <a:t>support model </a:t>
+            </a:r>
+            <a:r>
+              <a:rPr lang="en-US" dirty="0" smtClean="0"/>
+              <a:t>or middleman</a:t>
             </a:r>
             <a:endParaRPr lang="en-US" dirty="0"/>
           </a:p>
@@ -15024,15 +15156,15 @@
             </a:pPr>
             <a:r>
               <a:rPr lang="en-US" dirty="0" smtClean="0"/>
-              <a:t>Negative feedback is important </a:t>
-            </a:r>
-            <a:r>
-              <a:rPr lang="en-US" smtClean="0"/>
-              <a:t>for helping </a:t>
+              <a:t>Negative feedback </a:t>
             </a:r>
             <a:r>
               <a:rPr lang="en-US" dirty="0" smtClean="0"/>
-              <a:t>us to improve the quality of our services </a:t>
+              <a:t>helps us to </a:t>
+            </a:r>
+            <a:r>
+              <a:rPr lang="en-US" dirty="0" smtClean="0"/>
+              <a:t>improve the quality of our services </a:t>
             </a:r>
             <a:endParaRPr lang="en-US" dirty="0"/>
           </a:p>

</xml_diff>

<commit_message>
Last minute changes before the presentation.
</commit_message>
<xml_diff>
--- a/NeSI_I_Have_a Problem_and_I_Need_Support/NeSI_Service_Desk.pptx
+++ b/NeSI_I_Have_a Problem_and_I_Need_Support/NeSI_Service_Desk.pptx
@@ -202,7 +202,7 @@
           <a:p>
             <a:fld id="{271B8E02-D6ED-C74A-B267-DCBD1F5BCC55}" type="datetime1">
               <a:rPr lang="en-NZ" smtClean="0"/>
-              <a:t>20/03/15</a:t>
+              <a:t>24/03/15</a:t>
             </a:fld>
             <a:endParaRPr lang="en-NZ"/>
           </a:p>
@@ -372,7 +372,7 @@
           <a:p>
             <a:fld id="{D4F863EB-014E-EA45-958A-2E7D6F94880C}" type="datetime1">
               <a:rPr lang="en-NZ" smtClean="0"/>
-              <a:t>20/03/15</a:t>
+              <a:t>24/03/15</a:t>
             </a:fld>
             <a:endParaRPr lang="en-NZ"/>
           </a:p>
@@ -12579,11 +12579,7 @@
             </a:br>
             <a:r>
               <a:rPr lang="en-NZ" sz="1600" i="1" dirty="0" smtClean="0"/>
-              <a:t>Dan </a:t>
-            </a:r>
-            <a:r>
-              <a:rPr lang="en-NZ" sz="1600" i="1" dirty="0" smtClean="0"/>
-              <a:t>Sun – Computational Science Team Lead</a:t>
+              <a:t>Dan Sun – Computational Science Team Lead</a:t>
             </a:r>
             <a:endParaRPr lang="en-NZ" sz="1600" i="1" dirty="0"/>
           </a:p>
@@ -15055,27 +15051,23 @@
           <a:bodyPr/>
           <a:lstStyle/>
           <a:p>
+            <a:r>
+              <a:rPr lang="en-US" dirty="0" smtClean="0"/>
+              <a:t>A ticket closure survey is sent to the ticket’s requester when it is closed</a:t>
+            </a:r>
+          </a:p>
+          <a:p>
             <a:pPr marL="342900" indent="-342900">
               <a:buFont typeface="Arial"/>
               <a:buChar char="•"/>
             </a:pPr>
             <a:r>
               <a:rPr lang="en-US" dirty="0" smtClean="0"/>
-              <a:t>A ticket closure survey is sent to the ticket’s requester when it is closed</a:t>
-            </a:r>
-          </a:p>
-          <a:p>
-            <a:pPr marL="790575" lvl="1" indent="-342900">
-              <a:buFont typeface="Arial"/>
-              <a:buChar char="•"/>
-            </a:pPr>
-            <a:r>
-              <a:rPr lang="en-US" dirty="0" smtClean="0"/>
               <a:t>Positive feedback encourages people who contribute to the Service Desk and helps us to monitor our performance</a:t>
             </a:r>
           </a:p>
           <a:p>
-            <a:pPr marL="790575" lvl="1" indent="-342900">
+            <a:pPr marL="342900" indent="-342900">
               <a:buFont typeface="Arial"/>
               <a:buChar char="•"/>
             </a:pPr>

</xml_diff>